<commit_message>
slides13wf, w-->omega in 16.4
</commit_message>
<xml_diff>
--- a/fall11/slidesF11/slides13m.pptx
+++ b/fall11/slidesF11/slides13m.pptx
@@ -5293,7 +5293,7 @@
           <a:graphicData uri="http://schemas.openxmlformats.org/presentationml/2006/ole">
             <mc:AlternateContent xmlns:mc="http://schemas.openxmlformats.org/markup-compatibility/2006">
               <mc:Choice xmlns:v="urn:schemas-microsoft-com:vml" Requires="v">
-                <p:oleObj spid="_x0000_s106533" name="Equation" r:id="rId4" imgW="8204200" imgH="850900" progId="Equation.DSMT4">
+                <p:oleObj spid="_x0000_s106539" name="Equation" r:id="rId4" imgW="8204200" imgH="850900" progId="Equation.DSMT4">
                   <p:embed/>
                 </p:oleObj>
               </mc:Choice>
@@ -5363,7 +5363,7 @@
           <a:graphicData uri="http://schemas.openxmlformats.org/presentationml/2006/ole">
             <mc:AlternateContent xmlns:mc="http://schemas.openxmlformats.org/markup-compatibility/2006">
               <mc:Choice xmlns:v="urn:schemas-microsoft-com:vml" Requires="v">
-                <p:oleObj spid="_x0000_s106534" name="Equation" r:id="rId6" imgW="8204200" imgH="850900" progId="Equation.DSMT4">
+                <p:oleObj spid="_x0000_s106540" name="Equation" r:id="rId6" imgW="8204200" imgH="850900" progId="Equation.DSMT4">
                   <p:embed/>
                 </p:oleObj>
               </mc:Choice>
@@ -5433,7 +5433,7 @@
           <a:graphicData uri="http://schemas.openxmlformats.org/presentationml/2006/ole">
             <mc:AlternateContent xmlns:mc="http://schemas.openxmlformats.org/markup-compatibility/2006">
               <mc:Choice xmlns:v="urn:schemas-microsoft-com:vml" Requires="v">
-                <p:oleObj spid="_x0000_s106535" name="Equation" r:id="rId8" imgW="8204200" imgH="850900" progId="Equation.DSMT4">
+                <p:oleObj spid="_x0000_s106541" name="Equation" r:id="rId8" imgW="8204200" imgH="850900" progId="Equation.DSMT4">
                   <p:embed/>
                 </p:oleObj>
               </mc:Choice>
@@ -5627,7 +5627,7 @@
           <a:graphicData uri="http://schemas.openxmlformats.org/presentationml/2006/ole">
             <mc:AlternateContent xmlns:mc="http://schemas.openxmlformats.org/markup-compatibility/2006">
               <mc:Choice xmlns:v="urn:schemas-microsoft-com:vml" Requires="v">
-                <p:oleObj spid="_x0000_s106536" name="Equation" r:id="rId10" imgW="8204200" imgH="622300" progId="Equation.DSMT4">
+                <p:oleObj spid="_x0000_s106542" name="Equation" r:id="rId10" imgW="8204200" imgH="622300" progId="Equation.DSMT4">
                   <p:embed/>
                 </p:oleObj>
               </mc:Choice>
@@ -5697,7 +5697,7 @@
           <a:graphicData uri="http://schemas.openxmlformats.org/presentationml/2006/ole">
             <mc:AlternateContent xmlns:mc="http://schemas.openxmlformats.org/markup-compatibility/2006">
               <mc:Choice xmlns:v="urn:schemas-microsoft-com:vml" Requires="v">
-                <p:oleObj spid="_x0000_s106537" name="Equation" r:id="rId12" imgW="4038600" imgH="850900" progId="Equation.DSMT4">
+                <p:oleObj spid="_x0000_s106543" name="Equation" r:id="rId12" imgW="4038600" imgH="850900" progId="Equation.DSMT4">
                   <p:embed/>
                 </p:oleObj>
               </mc:Choice>
@@ -6254,7 +6254,7 @@
           <a:graphicData uri="http://schemas.openxmlformats.org/presentationml/2006/ole">
             <mc:AlternateContent xmlns:mc="http://schemas.openxmlformats.org/markup-compatibility/2006">
               <mc:Choice xmlns:v="urn:schemas-microsoft-com:vml" Requires="v">
-                <p:oleObj spid="_x0000_s108587" name="Equation" r:id="rId4" imgW="4114800" imgH="850900" progId="Equation.DSMT4">
+                <p:oleObj spid="_x0000_s108594" name="Equation" r:id="rId4" imgW="4114800" imgH="850900" progId="Equation.DSMT4">
                   <p:embed/>
                 </p:oleObj>
               </mc:Choice>
@@ -6318,7 +6318,7 @@
           <a:graphicData uri="http://schemas.openxmlformats.org/presentationml/2006/ole">
             <mc:AlternateContent xmlns:mc="http://schemas.openxmlformats.org/markup-compatibility/2006">
               <mc:Choice xmlns:v="urn:schemas-microsoft-com:vml" Requires="v">
-                <p:oleObj spid="_x0000_s108588" name="Equation" r:id="rId6" imgW="4101840" imgH="596880" progId="Equation.DSMT4">
+                <p:oleObj spid="_x0000_s108595" name="Equation" r:id="rId6" imgW="4101840" imgH="596880" progId="Equation.DSMT4">
                   <p:embed/>
                 </p:oleObj>
               </mc:Choice>
@@ -6388,7 +6388,7 @@
           <a:graphicData uri="http://schemas.openxmlformats.org/presentationml/2006/ole">
             <mc:AlternateContent xmlns:mc="http://schemas.openxmlformats.org/markup-compatibility/2006">
               <mc:Choice xmlns:v="urn:schemas-microsoft-com:vml" Requires="v">
-                <p:oleObj spid="_x0000_s108589" name="Equation" r:id="rId8" imgW="4317840" imgH="622080" progId="Equation.DSMT4">
+                <p:oleObj spid="_x0000_s108596" name="Equation" r:id="rId8" imgW="4317840" imgH="622080" progId="Equation.DSMT4">
                   <p:embed/>
                 </p:oleObj>
               </mc:Choice>
@@ -6495,7 +6495,7 @@
           <a:graphicData uri="http://schemas.openxmlformats.org/presentationml/2006/ole">
             <mc:AlternateContent xmlns:mc="http://schemas.openxmlformats.org/markup-compatibility/2006">
               <mc:Choice xmlns:v="urn:schemas-microsoft-com:vml" Requires="v">
-                <p:oleObj spid="_x0000_s108590" name="Equation" r:id="rId10" imgW="1981200" imgH="1778000" progId="Equation.DSMT4">
+                <p:oleObj spid="_x0000_s108597" name="Equation" r:id="rId10" imgW="1981200" imgH="1778000" progId="Equation.DSMT4">
                   <p:embed/>
                 </p:oleObj>
               </mc:Choice>
@@ -6559,7 +6559,7 @@
           <a:graphicData uri="http://schemas.openxmlformats.org/presentationml/2006/ole">
             <mc:AlternateContent xmlns:mc="http://schemas.openxmlformats.org/markup-compatibility/2006">
               <mc:Choice xmlns:v="urn:schemas-microsoft-com:vml" Requires="v">
-                <p:oleObj spid="_x0000_s108591" name="Equation" r:id="rId12" imgW="8280360" imgH="647640" progId="Equation.DSMT4">
+                <p:oleObj spid="_x0000_s108598" name="Equation" r:id="rId12" imgW="8280360" imgH="647640" progId="Equation.DSMT4">
                   <p:embed/>
                 </p:oleObj>
               </mc:Choice>
@@ -6629,7 +6629,7 @@
           <a:graphicData uri="http://schemas.openxmlformats.org/presentationml/2006/ole">
             <mc:AlternateContent xmlns:mc="http://schemas.openxmlformats.org/markup-compatibility/2006">
               <mc:Choice xmlns:v="urn:schemas-microsoft-com:vml" Requires="v">
-                <p:oleObj spid="_x0000_s108592" name="Equation" r:id="rId14" imgW="7251480" imgH="660240" progId="Equation.DSMT4">
+                <p:oleObj spid="_x0000_s108599" name="Equation" r:id="rId14" imgW="7251480" imgH="660240" progId="Equation.DSMT4">
                   <p:embed/>
                 </p:oleObj>
               </mc:Choice>
@@ -6953,7 +6953,7 @@
           <a:graphicData uri="http://schemas.openxmlformats.org/presentationml/2006/ole">
             <mc:AlternateContent xmlns:mc="http://schemas.openxmlformats.org/markup-compatibility/2006">
               <mc:Choice xmlns:v="urn:schemas-microsoft-com:vml" Requires="v">
-                <p:oleObj spid="_x0000_s334858" name="Equation" r:id="rId3" imgW="3987720" imgH="1384200" progId="Equation.DSMT4">
+                <p:oleObj spid="_x0000_s334860" name="Equation" r:id="rId3" imgW="3987720" imgH="1384200" progId="Equation.DSMT4">
                   <p:embed/>
                 </p:oleObj>
               </mc:Choice>
@@ -7094,7 +7094,7 @@
           <a:graphicData uri="http://schemas.openxmlformats.org/presentationml/2006/ole">
             <mc:AlternateContent xmlns:mc="http://schemas.openxmlformats.org/markup-compatibility/2006">
               <mc:Choice xmlns:v="urn:schemas-microsoft-com:vml" Requires="v">
-                <p:oleObj spid="_x0000_s253974" name="Equation" r:id="rId4" imgW="1168400" imgH="508000" progId="Equation.DSMT4">
+                <p:oleObj spid="_x0000_s253978" name="Equation" r:id="rId4" imgW="1168400" imgH="508000" progId="Equation.DSMT4">
                   <p:embed/>
                 </p:oleObj>
               </mc:Choice>
@@ -7164,7 +7164,7 @@
           <a:graphicData uri="http://schemas.openxmlformats.org/presentationml/2006/ole">
             <mc:AlternateContent xmlns:mc="http://schemas.openxmlformats.org/markup-compatibility/2006">
               <mc:Choice xmlns:v="urn:schemas-microsoft-com:vml" Requires="v">
-                <p:oleObj spid="_x0000_s253975" name="Equation" r:id="rId6" imgW="1181100" imgH="495300" progId="Equation.DSMT4">
+                <p:oleObj spid="_x0000_s253979" name="Equation" r:id="rId6" imgW="1181100" imgH="495300" progId="Equation.DSMT4">
                   <p:embed/>
                 </p:oleObj>
               </mc:Choice>
@@ -7292,7 +7292,7 @@
           <a:graphicData uri="http://schemas.openxmlformats.org/presentationml/2006/ole">
             <mc:AlternateContent xmlns:mc="http://schemas.openxmlformats.org/markup-compatibility/2006">
               <mc:Choice xmlns:v="urn:schemas-microsoft-com:vml" Requires="v">
-                <p:oleObj spid="_x0000_s253976" name="Equation" r:id="rId8" imgW="2527300" imgH="520700" progId="Equation.DSMT4">
+                <p:oleObj spid="_x0000_s253980" name="Equation" r:id="rId8" imgW="2527300" imgH="520700" progId="Equation.DSMT4">
                   <p:embed/>
                 </p:oleObj>
               </mc:Choice>
@@ -7793,7 +7793,7 @@
           <a:graphicData uri="http://schemas.openxmlformats.org/presentationml/2006/ole">
             <mc:AlternateContent xmlns:mc="http://schemas.openxmlformats.org/markup-compatibility/2006">
               <mc:Choice xmlns:v="urn:schemas-microsoft-com:vml" Requires="v">
-                <p:oleObj spid="_x0000_s45072" name="Equation" r:id="rId4" imgW="3987720" imgH="1384200" progId="Equation.DSMT4">
+                <p:oleObj spid="_x0000_s45075" name="Equation" r:id="rId4" imgW="3987720" imgH="1384200" progId="Equation.DSMT4">
                   <p:embed/>
                 </p:oleObj>
               </mc:Choice>
@@ -7863,7 +7863,7 @@
           <a:graphicData uri="http://schemas.openxmlformats.org/presentationml/2006/ole">
             <mc:AlternateContent xmlns:mc="http://schemas.openxmlformats.org/markup-compatibility/2006">
               <mc:Choice xmlns:v="urn:schemas-microsoft-com:vml" Requires="v">
-                <p:oleObj spid="_x0000_s45073" name="Equation" r:id="rId6" imgW="635000" imgH="266700" progId="Equation.DSMT4">
+                <p:oleObj spid="_x0000_s45076" name="Equation" r:id="rId6" imgW="635000" imgH="266700" progId="Equation.DSMT4">
                   <p:embed/>
                 </p:oleObj>
               </mc:Choice>
@@ -8359,7 +8359,7 @@
           <a:graphicData uri="http://schemas.openxmlformats.org/presentationml/2006/ole">
             <mc:AlternateContent xmlns:mc="http://schemas.openxmlformats.org/markup-compatibility/2006">
               <mc:Choice xmlns:v="urn:schemas-microsoft-com:vml" Requires="v">
-                <p:oleObj spid="_x0000_s43023" name="Equation" r:id="rId4" imgW="3987720" imgH="1244520" progId="Equation.DSMT4">
+                <p:oleObj spid="_x0000_s43026" name="Equation" r:id="rId4" imgW="3987720" imgH="1244520" progId="Equation.DSMT4">
                   <p:embed/>
                 </p:oleObj>
               </mc:Choice>
@@ -8429,7 +8429,7 @@
           <a:graphicData uri="http://schemas.openxmlformats.org/presentationml/2006/ole">
             <mc:AlternateContent xmlns:mc="http://schemas.openxmlformats.org/markup-compatibility/2006">
               <mc:Choice xmlns:v="urn:schemas-microsoft-com:vml" Requires="v">
-                <p:oleObj spid="_x0000_s43024" name="Equation" r:id="rId6" imgW="6451560" imgH="711000" progId="Equation.DSMT4">
+                <p:oleObj spid="_x0000_s43027" name="Equation" r:id="rId6" imgW="6451560" imgH="711000" progId="Equation.DSMT4">
                   <p:embed/>
                 </p:oleObj>
               </mc:Choice>
@@ -9139,7 +9139,7 @@
           <a:graphicData uri="http://schemas.openxmlformats.org/presentationml/2006/ole">
             <mc:AlternateContent xmlns:mc="http://schemas.openxmlformats.org/markup-compatibility/2006">
               <mc:Choice xmlns:v="urn:schemas-microsoft-com:vml" Requires="v">
-                <p:oleObj spid="_x0000_s190484" name="Equation" r:id="rId4" imgW="3987720" imgH="1244520" progId="Equation.DSMT4">
+                <p:oleObj spid="_x0000_s190488" name="Equation" r:id="rId4" imgW="3987720" imgH="1244520" progId="Equation.DSMT4">
                   <p:embed/>
                 </p:oleObj>
               </mc:Choice>
@@ -9209,7 +9209,7 @@
           <a:graphicData uri="http://schemas.openxmlformats.org/presentationml/2006/ole">
             <mc:AlternateContent xmlns:mc="http://schemas.openxmlformats.org/markup-compatibility/2006">
               <mc:Choice xmlns:v="urn:schemas-microsoft-com:vml" Requires="v">
-                <p:oleObj spid="_x0000_s190485" name="Equation" r:id="rId6" imgW="6451560" imgH="711000" progId="Equation.DSMT4">
+                <p:oleObj spid="_x0000_s190489" name="Equation" r:id="rId6" imgW="6451560" imgH="711000" progId="Equation.DSMT4">
                   <p:embed/>
                 </p:oleObj>
               </mc:Choice>
@@ -9279,7 +9279,7 @@
           <a:graphicData uri="http://schemas.openxmlformats.org/presentationml/2006/ole">
             <mc:AlternateContent xmlns:mc="http://schemas.openxmlformats.org/markup-compatibility/2006">
               <mc:Choice xmlns:v="urn:schemas-microsoft-com:vml" Requires="v">
-                <p:oleObj spid="_x0000_s190486" name="Equation" r:id="rId8" imgW="5321160" imgH="1346040" progId="Equation.DSMT4">
+                <p:oleObj spid="_x0000_s190490" name="Equation" r:id="rId8" imgW="5321160" imgH="1346040" progId="Equation.DSMT4">
                   <p:embed/>
                 </p:oleObj>
               </mc:Choice>
@@ -9602,7 +9602,7 @@
           <a:graphicData uri="http://schemas.openxmlformats.org/presentationml/2006/ole">
             <mc:AlternateContent xmlns:mc="http://schemas.openxmlformats.org/markup-compatibility/2006">
               <mc:Choice xmlns:v="urn:schemas-microsoft-com:vml" Requires="v">
-                <p:oleObj spid="_x0000_s40974" name="Equation" r:id="rId4" imgW="5511600" imgH="1523880" progId="Equation.DSMT4">
+                <p:oleObj spid="_x0000_s40977" name="Equation" r:id="rId4" imgW="5511600" imgH="1523880" progId="Equation.DSMT4">
                   <p:embed/>
                 </p:oleObj>
               </mc:Choice>
@@ -9710,7 +9710,7 @@
           <a:graphicData uri="http://schemas.openxmlformats.org/presentationml/2006/ole">
             <mc:AlternateContent xmlns:mc="http://schemas.openxmlformats.org/markup-compatibility/2006">
               <mc:Choice xmlns:v="urn:schemas-microsoft-com:vml" Requires="v">
-                <p:oleObj spid="_x0000_s40975" name="Equation" r:id="rId6" imgW="6883400" imgH="2184400" progId="Equation.DSMT4">
+                <p:oleObj spid="_x0000_s40978" name="Equation" r:id="rId6" imgW="6883400" imgH="2184400" progId="Equation.DSMT4">
                   <p:embed/>
                 </p:oleObj>
               </mc:Choice>
@@ -10146,7 +10146,7 @@
           <a:graphicData uri="http://schemas.openxmlformats.org/presentationml/2006/ole">
             <mc:AlternateContent xmlns:mc="http://schemas.openxmlformats.org/markup-compatibility/2006">
               <mc:Choice xmlns:v="urn:schemas-microsoft-com:vml" Requires="v">
-                <p:oleObj spid="_x0000_s66580" name="Equation" r:id="rId4" imgW="5689600" imgH="1092200" progId="Equation.DSMT4">
+                <p:oleObj spid="_x0000_s66583" name="Equation" r:id="rId4" imgW="5689600" imgH="1092200" progId="Equation.DSMT4">
                   <p:embed/>
                 </p:oleObj>
               </mc:Choice>
@@ -10270,7 +10270,7 @@
           <a:graphicData uri="http://schemas.openxmlformats.org/presentationml/2006/ole">
             <mc:AlternateContent xmlns:mc="http://schemas.openxmlformats.org/markup-compatibility/2006">
               <mc:Choice xmlns:v="urn:schemas-microsoft-com:vml" Requires="v">
-                <p:oleObj spid="_x0000_s66581" name="Equation" r:id="rId6" imgW="5219640" imgH="1460160" progId="Equation.DSMT4">
+                <p:oleObj spid="_x0000_s66584" name="Equation" r:id="rId6" imgW="5219640" imgH="1460160" progId="Equation.DSMT4">
                   <p:embed/>
                 </p:oleObj>
               </mc:Choice>
@@ -10723,7 +10723,7 @@
           <a:graphicData uri="http://schemas.openxmlformats.org/presentationml/2006/ole">
             <mc:AlternateContent xmlns:mc="http://schemas.openxmlformats.org/markup-compatibility/2006">
               <mc:Choice xmlns:v="urn:schemas-microsoft-com:vml" Requires="v">
-                <p:oleObj spid="_x0000_s67606" name="Equation" r:id="rId4" imgW="7289800" imgH="1625600" progId="Equation.DSMT4">
+                <p:oleObj spid="_x0000_s67610" name="Equation" r:id="rId4" imgW="7289800" imgH="1625600" progId="Equation.DSMT4">
                   <p:embed/>
                 </p:oleObj>
               </mc:Choice>
@@ -10793,7 +10793,7 @@
           <a:graphicData uri="http://schemas.openxmlformats.org/presentationml/2006/ole">
             <mc:AlternateContent xmlns:mc="http://schemas.openxmlformats.org/markup-compatibility/2006">
               <mc:Choice xmlns:v="urn:schemas-microsoft-com:vml" Requires="v">
-                <p:oleObj spid="_x0000_s67607" name="Equation" r:id="rId6" imgW="5905500" imgH="889000" progId="Equation.DSMT4">
+                <p:oleObj spid="_x0000_s67611" name="Equation" r:id="rId6" imgW="5905500" imgH="889000" progId="Equation.DSMT4">
                   <p:embed/>
                 </p:oleObj>
               </mc:Choice>
@@ -10983,7 +10983,7 @@
             <a:graphicData uri="http://schemas.openxmlformats.org/presentationml/2006/ole">
               <mc:AlternateContent xmlns:mc="http://schemas.openxmlformats.org/markup-compatibility/2006">
                 <mc:Choice xmlns:v="urn:schemas-microsoft-com:vml" Requires="v">
-                  <p:oleObj spid="_x0000_s67608" name="Equation" r:id="rId8" imgW="2768600" imgH="571500" progId="Equation.DSMT4">
+                  <p:oleObj spid="_x0000_s67612" name="Equation" r:id="rId8" imgW="2768600" imgH="571500" progId="Equation.DSMT4">
                     <p:embed/>
                   </p:oleObj>
                 </mc:Choice>
@@ -11509,7 +11509,7 @@
           <a:graphicData uri="http://schemas.openxmlformats.org/presentationml/2006/ole">
             <mc:AlternateContent xmlns:mc="http://schemas.openxmlformats.org/markup-compatibility/2006">
               <mc:Choice xmlns:v="urn:schemas-microsoft-com:vml" Requires="v">
-                <p:oleObj spid="_x0000_s185367" name="Equation" r:id="rId4" imgW="3035300" imgH="342900" progId="Equation.3">
+                <p:oleObj spid="_x0000_s185371" name="Equation" r:id="rId4" imgW="3035300" imgH="342900" progId="Equation.3">
                   <p:embed/>
                 </p:oleObj>
               </mc:Choice>
@@ -11579,7 +11579,7 @@
           <a:graphicData uri="http://schemas.openxmlformats.org/presentationml/2006/ole">
             <mc:AlternateContent xmlns:mc="http://schemas.openxmlformats.org/markup-compatibility/2006">
               <mc:Choice xmlns:v="urn:schemas-microsoft-com:vml" Requires="v">
-                <p:oleObj spid="_x0000_s185368" name="Equation" r:id="rId6" imgW="2603500" imgH="342900" progId="Equation.3">
+                <p:oleObj spid="_x0000_s185372" name="Equation" r:id="rId6" imgW="2603500" imgH="342900" progId="Equation.3">
                   <p:embed/>
                 </p:oleObj>
               </mc:Choice>
@@ -11649,7 +11649,7 @@
           <a:graphicData uri="http://schemas.openxmlformats.org/presentationml/2006/ole">
             <mc:AlternateContent xmlns:mc="http://schemas.openxmlformats.org/markup-compatibility/2006">
               <mc:Choice xmlns:v="urn:schemas-microsoft-com:vml" Requires="v">
-                <p:oleObj spid="_x0000_s185369" name="Equation" r:id="rId8" imgW="2692400" imgH="342900" progId="Equation.3">
+                <p:oleObj spid="_x0000_s185373" name="Equation" r:id="rId8" imgW="2692400" imgH="342900" progId="Equation.3">
                   <p:embed/>
                 </p:oleObj>
               </mc:Choice>
@@ -12093,7 +12093,7 @@
           <a:graphicData uri="http://schemas.openxmlformats.org/presentationml/2006/ole">
             <mc:AlternateContent xmlns:mc="http://schemas.openxmlformats.org/markup-compatibility/2006">
               <mc:Choice xmlns:v="urn:schemas-microsoft-com:vml" Requires="v">
-                <p:oleObj spid="_x0000_s109580" name="Equation" r:id="rId4" imgW="6832600" imgH="3098800" progId="Equation.DSMT4">
+                <p:oleObj spid="_x0000_s109582" name="Equation" r:id="rId4" imgW="6832600" imgH="3098800" progId="Equation.DSMT4">
                   <p:embed/>
                 </p:oleObj>
               </mc:Choice>
@@ -12592,7 +12592,7 @@
           <a:graphicData uri="http://schemas.openxmlformats.org/presentationml/2006/ole">
             <mc:AlternateContent xmlns:mc="http://schemas.openxmlformats.org/markup-compatibility/2006">
               <mc:Choice xmlns:v="urn:schemas-microsoft-com:vml" Requires="v">
-                <p:oleObj spid="_x0000_s301077" name="Equation" r:id="rId4" imgW="6832600" imgH="3098800" progId="Equation.DSMT4">
+                <p:oleObj spid="_x0000_s301081" name="Equation" r:id="rId4" imgW="6832600" imgH="3098800" progId="Equation.DSMT4">
                   <p:embed/>
                 </p:oleObj>
               </mc:Choice>
@@ -12662,7 +12662,7 @@
           <a:graphicData uri="http://schemas.openxmlformats.org/presentationml/2006/ole">
             <mc:AlternateContent xmlns:mc="http://schemas.openxmlformats.org/markup-compatibility/2006">
               <mc:Choice xmlns:v="urn:schemas-microsoft-com:vml" Requires="v">
-                <p:oleObj spid="_x0000_s301078" name="Equation" r:id="rId6" imgW="1739900" imgH="1600200" progId="Equation.DSMT4">
+                <p:oleObj spid="_x0000_s301082" name="Equation" r:id="rId6" imgW="1739900" imgH="1600200" progId="Equation.DSMT4">
                   <p:embed/>
                 </p:oleObj>
               </mc:Choice>
@@ -12732,7 +12732,7 @@
           <a:graphicData uri="http://schemas.openxmlformats.org/presentationml/2006/ole">
             <mc:AlternateContent xmlns:mc="http://schemas.openxmlformats.org/markup-compatibility/2006">
               <mc:Choice xmlns:v="urn:schemas-microsoft-com:vml" Requires="v">
-                <p:oleObj spid="_x0000_s301079" name="Equation" r:id="rId8" imgW="1346200" imgH="1600200" progId="Equation.DSMT4">
+                <p:oleObj spid="_x0000_s301083" name="Equation" r:id="rId8" imgW="1346200" imgH="1600200" progId="Equation.DSMT4">
                   <p:embed/>
                 </p:oleObj>
               </mc:Choice>
@@ -13290,7 +13290,7 @@
           <a:graphicData uri="http://schemas.openxmlformats.org/presentationml/2006/ole">
             <mc:AlternateContent xmlns:mc="http://schemas.openxmlformats.org/markup-compatibility/2006">
               <mc:Choice xmlns:v="urn:schemas-microsoft-com:vml" Requires="v">
-                <p:oleObj spid="_x0000_s299029" name="Equation" r:id="rId4" imgW="6832600" imgH="3098800" progId="Equation.DSMT4">
+                <p:oleObj spid="_x0000_s299033" name="Equation" r:id="rId4" imgW="6832600" imgH="3098800" progId="Equation.DSMT4">
                   <p:embed/>
                 </p:oleObj>
               </mc:Choice>
@@ -13360,7 +13360,7 @@
           <a:graphicData uri="http://schemas.openxmlformats.org/presentationml/2006/ole">
             <mc:AlternateContent xmlns:mc="http://schemas.openxmlformats.org/markup-compatibility/2006">
               <mc:Choice xmlns:v="urn:schemas-microsoft-com:vml" Requires="v">
-                <p:oleObj spid="_x0000_s299030" name="Equation" r:id="rId6" imgW="2387600" imgH="2527300" progId="Equation.DSMT4">
+                <p:oleObj spid="_x0000_s299034" name="Equation" r:id="rId6" imgW="2387600" imgH="2527300" progId="Equation.DSMT4">
                   <p:embed/>
                 </p:oleObj>
               </mc:Choice>
@@ -13430,7 +13430,7 @@
           <a:graphicData uri="http://schemas.openxmlformats.org/presentationml/2006/ole">
             <mc:AlternateContent xmlns:mc="http://schemas.openxmlformats.org/markup-compatibility/2006">
               <mc:Choice xmlns:v="urn:schemas-microsoft-com:vml" Requires="v">
-                <p:oleObj spid="_x0000_s299031" name="Equation" r:id="rId8" imgW="1346200" imgH="1600200" progId="Equation.DSMT4">
+                <p:oleObj spid="_x0000_s299035" name="Equation" r:id="rId8" imgW="1346200" imgH="1600200" progId="Equation.DSMT4">
                   <p:embed/>
                 </p:oleObj>
               </mc:Choice>
@@ -13828,7 +13828,7 @@
           <a:graphicData uri="http://schemas.openxmlformats.org/presentationml/2006/ole">
             <mc:AlternateContent xmlns:mc="http://schemas.openxmlformats.org/markup-compatibility/2006">
               <mc:Choice xmlns:v="urn:schemas-microsoft-com:vml" Requires="v">
-                <p:oleObj spid="_x0000_s70674" name="Equation" r:id="rId4" imgW="5626100" imgH="2120900" progId="Equation.DSMT4">
+                <p:oleObj spid="_x0000_s70677" name="Equation" r:id="rId4" imgW="5626100" imgH="2120900" progId="Equation.DSMT4">
                   <p:embed/>
                 </p:oleObj>
               </mc:Choice>
@@ -13934,7 +13934,7 @@
           <a:graphicData uri="http://schemas.openxmlformats.org/presentationml/2006/ole">
             <mc:AlternateContent xmlns:mc="http://schemas.openxmlformats.org/markup-compatibility/2006">
               <mc:Choice xmlns:v="urn:schemas-microsoft-com:vml" Requires="v">
-                <p:oleObj spid="_x0000_s70675" name="Equation" r:id="rId6" imgW="3136680" imgH="1066680" progId="Equation.DSMT4">
+                <p:oleObj spid="_x0000_s70678" name="Equation" r:id="rId6" imgW="3136680" imgH="1066680" progId="Equation.DSMT4">
                   <p:embed/>
                 </p:oleObj>
               </mc:Choice>
@@ -14349,7 +14349,7 @@
           <a:graphicData uri="http://schemas.openxmlformats.org/presentationml/2006/ole">
             <mc:AlternateContent xmlns:mc="http://schemas.openxmlformats.org/markup-compatibility/2006">
               <mc:Choice xmlns:v="urn:schemas-microsoft-com:vml" Requires="v">
-                <p:oleObj spid="_x0000_s303114" name="Equation" r:id="rId4" imgW="6184900" imgH="2692400" progId="Equation.DSMT4">
+                <p:oleObj spid="_x0000_s303116" name="Equation" r:id="rId4" imgW="6184900" imgH="2692400" progId="Equation.DSMT4">
                   <p:embed/>
                 </p:oleObj>
               </mc:Choice>
@@ -14997,7 +14997,7 @@
             <a:graphicData uri="http://schemas.openxmlformats.org/presentationml/2006/ole">
               <mc:AlternateContent xmlns:mc="http://schemas.openxmlformats.org/markup-compatibility/2006">
                 <mc:Choice xmlns:v="urn:schemas-microsoft-com:vml" Requires="v">
-                  <p:oleObj spid="_x0000_s278538" name="Equation" r:id="rId6" imgW="215900" imgH="330200" progId="Equation.DSMT4">
+                  <p:oleObj spid="_x0000_s278540" name="Equation" r:id="rId6" imgW="215900" imgH="330200" progId="Equation.DSMT4">
                     <p:embed/>
                   </p:oleObj>
                 </mc:Choice>
@@ -15099,9 +15099,18 @@
   <p:clrMapOvr>
     <a:masterClrMapping/>
   </p:clrMapOvr>
-  <p:transition xmlns:p14="http://schemas.microsoft.com/office/powerpoint/2010/main" spd="slow">
-    <p:fade thruBlk="1"/>
-  </p:transition>
+  <mc:AlternateContent xmlns:mc="http://schemas.openxmlformats.org/markup-compatibility/2006">
+    <mc:Choice xmlns:p14="http://schemas.microsoft.com/office/powerpoint/2010/main" Requires="p14">
+      <p:transition spd="slow" p14:dur="1200">
+        <p:fade thruBlk="1"/>
+      </p:transition>
+    </mc:Choice>
+    <mc:Fallback>
+      <p:transition xmlns:p14="http://schemas.microsoft.com/office/powerpoint/2010/main" spd="slow">
+        <p:fade thruBlk="1"/>
+      </p:transition>
+    </mc:Fallback>
+  </mc:AlternateContent>
   <p:timing>
     <p:tnLst>
       <p:par>
@@ -16494,7 +16503,7 @@
           <a:graphicData uri="http://schemas.openxmlformats.org/presentationml/2006/ole">
             <mc:AlternateContent xmlns:mc="http://schemas.openxmlformats.org/markup-compatibility/2006">
               <mc:Choice xmlns:v="urn:schemas-microsoft-com:vml" Requires="v">
-                <p:oleObj spid="_x0000_s192543" name="Equation" r:id="rId4" imgW="8280400" imgH="850900" progId="Equation.DSMT4">
+                <p:oleObj spid="_x0000_s192548" name="Equation" r:id="rId4" imgW="8280400" imgH="850900" progId="Equation.DSMT4">
                   <p:embed/>
                 </p:oleObj>
               </mc:Choice>
@@ -16721,7 +16730,7 @@
           <a:graphicData uri="http://schemas.openxmlformats.org/presentationml/2006/ole">
             <mc:AlternateContent xmlns:mc="http://schemas.openxmlformats.org/markup-compatibility/2006">
               <mc:Choice xmlns:v="urn:schemas-microsoft-com:vml" Requires="v">
-                <p:oleObj spid="_x0000_s192544" name="Equation" r:id="rId6" imgW="7988300" imgH="863600" progId="Equation.DSMT4">
+                <p:oleObj spid="_x0000_s192549" name="Equation" r:id="rId6" imgW="7988300" imgH="863600" progId="Equation.DSMT4">
                   <p:embed/>
                 </p:oleObj>
               </mc:Choice>
@@ -16822,7 +16831,7 @@
           <a:graphicData uri="http://schemas.openxmlformats.org/presentationml/2006/ole">
             <mc:AlternateContent xmlns:mc="http://schemas.openxmlformats.org/markup-compatibility/2006">
               <mc:Choice xmlns:v="urn:schemas-microsoft-com:vml" Requires="v">
-                <p:oleObj spid="_x0000_s192545" name="Equation" r:id="rId8" imgW="8178480" imgH="685800" progId="Equation.DSMT4">
+                <p:oleObj spid="_x0000_s192550" name="Equation" r:id="rId8" imgW="8178480" imgH="685800" progId="Equation.DSMT4">
                   <p:embed/>
                 </p:oleObj>
               </mc:Choice>
@@ -17093,7 +17102,7 @@
           <a:graphicData uri="http://schemas.openxmlformats.org/presentationml/2006/ole">
             <mc:AlternateContent xmlns:mc="http://schemas.openxmlformats.org/markup-compatibility/2006">
               <mc:Choice xmlns:v="urn:schemas-microsoft-com:vml" Requires="v">
-                <p:oleObj spid="_x0000_s192546" name="Equation" r:id="rId10" imgW="7708900" imgH="774700" progId="Equation.DSMT4">
+                <p:oleObj spid="_x0000_s192551" name="Equation" r:id="rId10" imgW="7708900" imgH="774700" progId="Equation.DSMT4">
                   <p:embed/>
                 </p:oleObj>
               </mc:Choice>
@@ -17772,7 +17781,7 @@
           <a:graphicData uri="http://schemas.openxmlformats.org/presentationml/2006/ole">
             <mc:AlternateContent xmlns:mc="http://schemas.openxmlformats.org/markup-compatibility/2006">
               <mc:Choice xmlns:v="urn:schemas-microsoft-com:vml" Requires="v">
-                <p:oleObj spid="_x0000_s113680" name="Equation" r:id="rId4" imgW="5257800" imgH="1434960" progId="Equation.DSMT4">
+                <p:oleObj spid="_x0000_s113683" name="Equation" r:id="rId4" imgW="5257800" imgH="1434960" progId="Equation.DSMT4">
                   <p:embed/>
                 </p:oleObj>
               </mc:Choice>
@@ -17880,7 +17889,7 @@
           <a:graphicData uri="http://schemas.openxmlformats.org/presentationml/2006/ole">
             <mc:AlternateContent xmlns:mc="http://schemas.openxmlformats.org/markup-compatibility/2006">
               <mc:Choice xmlns:v="urn:schemas-microsoft-com:vml" Requires="v">
-                <p:oleObj spid="_x0000_s113681" name="Equation" r:id="rId6" imgW="5638680" imgH="736560" progId="Equation.DSMT4">
+                <p:oleObj spid="_x0000_s113684" name="Equation" r:id="rId6" imgW="5638680" imgH="736560" progId="Equation.DSMT4">
                   <p:embed/>
                 </p:oleObj>
               </mc:Choice>
@@ -18264,7 +18273,7 @@
           <a:graphicData uri="http://schemas.openxmlformats.org/presentationml/2006/ole">
             <mc:AlternateContent xmlns:mc="http://schemas.openxmlformats.org/markup-compatibility/2006">
               <mc:Choice xmlns:v="urn:schemas-microsoft-com:vml" Requires="v">
-                <p:oleObj spid="_x0000_s187412" name="Equation" r:id="rId4" imgW="2908300" imgH="342900" progId="Equation.3">
+                <p:oleObj spid="_x0000_s187416" name="Equation" r:id="rId4" imgW="2908300" imgH="342900" progId="Equation.3">
                   <p:embed/>
                 </p:oleObj>
               </mc:Choice>
@@ -18334,7 +18343,7 @@
           <a:graphicData uri="http://schemas.openxmlformats.org/presentationml/2006/ole">
             <mc:AlternateContent xmlns:mc="http://schemas.openxmlformats.org/markup-compatibility/2006">
               <mc:Choice xmlns:v="urn:schemas-microsoft-com:vml" Requires="v">
-                <p:oleObj spid="_x0000_s187413" name="Equation" r:id="rId6" imgW="1727200" imgH="342900" progId="Equation.3">
+                <p:oleObj spid="_x0000_s187417" name="Equation" r:id="rId6" imgW="1727200" imgH="342900" progId="Equation.3">
                   <p:embed/>
                 </p:oleObj>
               </mc:Choice>
@@ -18404,7 +18413,7 @@
           <a:graphicData uri="http://schemas.openxmlformats.org/presentationml/2006/ole">
             <mc:AlternateContent xmlns:mc="http://schemas.openxmlformats.org/markup-compatibility/2006">
               <mc:Choice xmlns:v="urn:schemas-microsoft-com:vml" Requires="v">
-                <p:oleObj spid="_x0000_s187414" name="Equation" r:id="rId8" imgW="1866900" imgH="304800" progId="Equation.3">
+                <p:oleObj spid="_x0000_s187418" name="Equation" r:id="rId8" imgW="1866900" imgH="304800" progId="Equation.3">
                   <p:embed/>
                 </p:oleObj>
               </mc:Choice>
@@ -18793,7 +18802,7 @@
           <a:graphicData uri="http://schemas.openxmlformats.org/presentationml/2006/ole">
             <mc:AlternateContent xmlns:mc="http://schemas.openxmlformats.org/markup-compatibility/2006">
               <mc:Choice xmlns:v="urn:schemas-microsoft-com:vml" Requires="v">
-                <p:oleObj spid="_x0000_s114699" name="Equation" r:id="rId4" imgW="4191000" imgH="1092200" progId="Equation.DSMT4">
+                <p:oleObj spid="_x0000_s114701" name="Equation" r:id="rId4" imgW="4191000" imgH="1092200" progId="Equation.DSMT4">
                   <p:embed/>
                 </p:oleObj>
               </mc:Choice>
@@ -19107,7 +19116,7 @@
           <a:graphicData uri="http://schemas.openxmlformats.org/presentationml/2006/ole">
             <mc:AlternateContent xmlns:mc="http://schemas.openxmlformats.org/markup-compatibility/2006">
               <mc:Choice xmlns:v="urn:schemas-microsoft-com:vml" Requires="v">
-                <p:oleObj spid="_x0000_s330762" name="Equation" r:id="rId3" imgW="2095500" imgH="304800" progId="Equation.DSMT4">
+                <p:oleObj spid="_x0000_s330764" name="Equation" r:id="rId3" imgW="2095500" imgH="304800" progId="Equation.DSMT4">
                   <p:embed/>
                 </p:oleObj>
               </mc:Choice>
@@ -19365,15 +19374,7 @@
             </a:pPr>
             <a:r>
               <a:rPr lang="en-US" sz="4800" dirty="0" smtClean="0"/>
-              <a:t>handle	     </a:t>
-            </a:r>
-            <a:r>
-              <a:rPr lang="en-US" sz="4800" dirty="0" smtClean="0"/>
-              <a:t>    </a:t>
-            </a:r>
-            <a:r>
-              <a:rPr lang="en-US" sz="4800" dirty="0" smtClean="0"/>
-              <a:t>with</a:t>
+              <a:t>handle	         with</a:t>
             </a:r>
           </a:p>
           <a:p>
@@ -19400,11 +19401,7 @@
             </a:r>
             <a:r>
               <a:rPr lang="en-US" sz="4800" dirty="0" smtClean="0"/>
-              <a:t>          </a:t>
-            </a:r>
-            <a:r>
-              <a:rPr lang="en-US" sz="4800" dirty="0" smtClean="0"/>
-              <a:t>   </a:t>
+              <a:t>             </a:t>
             </a:r>
             <a:r>
               <a:rPr lang="en-US" sz="4800" dirty="0" smtClean="0">
@@ -19435,15 +19432,7 @@
                   <a:srgbClr val="0000E5"/>
                 </a:solidFill>
               </a:rPr>
-              <a:t>+ </a:t>
-            </a:r>
-            <a:r>
-              <a:rPr lang="en-US" sz="4800" dirty="0" smtClean="0">
-                <a:solidFill>
-                  <a:srgbClr val="0000E5"/>
-                </a:solidFill>
-              </a:rPr>
-              <a:t>2</a:t>
+              <a:t>+ 2</a:t>
             </a:r>
             <a:r>
               <a:rPr lang="en-US" sz="4800" baseline="30000" dirty="0" smtClean="0">
@@ -19455,11 +19444,7 @@
             </a:r>
             <a:r>
               <a:rPr lang="en-US" sz="4800" dirty="0" smtClean="0"/>
-              <a:t>        </a:t>
-            </a:r>
-            <a:r>
-              <a:rPr lang="en-US" sz="4800" dirty="0" smtClean="0"/>
-              <a:t>   </a:t>
+              <a:t>           </a:t>
             </a:r>
             <a:r>
               <a:rPr lang="en-US" sz="4800" dirty="0" smtClean="0">
@@ -19490,23 +19475,11 @@
                   <a:srgbClr val="0000E5"/>
                 </a:solidFill>
               </a:rPr>
-              <a:t>+ </a:t>
-            </a:r>
-            <a:r>
-              <a:rPr lang="en-US" sz="4800" dirty="0" smtClean="0">
-                <a:solidFill>
-                  <a:srgbClr val="0000E5"/>
-                </a:solidFill>
-              </a:rPr>
-              <a:t>n</a:t>
+              <a:t>+ n</a:t>
             </a:r>
             <a:r>
               <a:rPr lang="en-US" sz="4800" dirty="0" smtClean="0"/>
-              <a:t>          </a:t>
-            </a:r>
-            <a:r>
-              <a:rPr lang="en-US" sz="4800" dirty="0" smtClean="0"/>
-              <a:t>  </a:t>
+              <a:t>            </a:t>
             </a:r>
             <a:r>
               <a:rPr lang="en-US" sz="4800" dirty="0" smtClean="0">
@@ -19545,15 +19518,7 @@
                   <a:srgbClr val="0000E5"/>
                 </a:solidFill>
               </a:rPr>
-              <a:t>+ </a:t>
-            </a:r>
-            <a:r>
-              <a:rPr lang="en-US" sz="4800" dirty="0" smtClean="0">
-                <a:solidFill>
-                  <a:srgbClr val="0000E5"/>
-                </a:solidFill>
-              </a:rPr>
-              <a:t>n</a:t>
+              <a:t>+ n</a:t>
             </a:r>
             <a:r>
               <a:rPr lang="en-US" sz="4800" baseline="30000" dirty="0" smtClean="0">
@@ -19565,11 +19530,7 @@
             </a:r>
             <a:r>
               <a:rPr lang="en-US" sz="4800" dirty="0" smtClean="0"/>
-              <a:t>       </a:t>
-            </a:r>
-            <a:r>
-              <a:rPr lang="en-US" sz="4800" dirty="0" smtClean="0"/>
-              <a:t>    </a:t>
+              <a:t>           </a:t>
             </a:r>
             <a:r>
               <a:rPr lang="en-US" sz="4800" dirty="0" smtClean="0">
@@ -19662,15 +19623,7 @@
                   <a:srgbClr val="0000E5"/>
                 </a:solidFill>
               </a:rPr>
-              <a:t>   </a:t>
-            </a:r>
-            <a:r>
-              <a:rPr lang="en-US" sz="4800" baseline="30000" smtClean="0">
-                <a:solidFill>
-                  <a:srgbClr val="0000E5"/>
-                </a:solidFill>
-              </a:rPr>
-              <a:t>      </a:t>
+              <a:t>         </a:t>
             </a:r>
             <a:r>
               <a:rPr lang="en-US" sz="4800" smtClean="0">
@@ -20423,7 +20376,7 @@
           <a:graphicData uri="http://schemas.openxmlformats.org/presentationml/2006/ole">
             <mc:AlternateContent xmlns:mc="http://schemas.openxmlformats.org/markup-compatibility/2006">
               <mc:Choice xmlns:v="urn:schemas-microsoft-com:vml" Requires="v">
-                <p:oleObj spid="_x0000_s188437" name="Equation" r:id="rId4" imgW="2971800" imgH="342900" progId="Equation.3">
+                <p:oleObj spid="_x0000_s188441" name="Equation" r:id="rId4" imgW="2971800" imgH="342900" progId="Equation.3">
                   <p:embed/>
                 </p:oleObj>
               </mc:Choice>
@@ -20493,7 +20446,7 @@
           <a:graphicData uri="http://schemas.openxmlformats.org/presentationml/2006/ole">
             <mc:AlternateContent xmlns:mc="http://schemas.openxmlformats.org/markup-compatibility/2006">
               <mc:Choice xmlns:v="urn:schemas-microsoft-com:vml" Requires="v">
-                <p:oleObj spid="_x0000_s188438" name="Equation" r:id="rId6" imgW="3390900" imgH="342900" progId="Equation.3">
+                <p:oleObj spid="_x0000_s188442" name="Equation" r:id="rId6" imgW="3390900" imgH="342900" progId="Equation.3">
                   <p:embed/>
                 </p:oleObj>
               </mc:Choice>
@@ -20563,7 +20516,7 @@
           <a:graphicData uri="http://schemas.openxmlformats.org/presentationml/2006/ole">
             <mc:AlternateContent xmlns:mc="http://schemas.openxmlformats.org/markup-compatibility/2006">
               <mc:Choice xmlns:v="urn:schemas-microsoft-com:vml" Requires="v">
-                <p:oleObj spid="_x0000_s188439" name="Equation" r:id="rId8" imgW="2768600" imgH="495300" progId="Equation.3">
+                <p:oleObj spid="_x0000_s188443" name="Equation" r:id="rId8" imgW="2768600" imgH="495300" progId="Equation.3">
                   <p:embed/>
                 </p:oleObj>
               </mc:Choice>
@@ -20957,7 +20910,7 @@
           <a:graphicData uri="http://schemas.openxmlformats.org/presentationml/2006/ole">
             <mc:AlternateContent xmlns:mc="http://schemas.openxmlformats.org/markup-compatibility/2006">
               <mc:Choice xmlns:v="urn:schemas-microsoft-com:vml" Requires="v">
-                <p:oleObj spid="_x0000_s26675" name="Equation" r:id="rId4" imgW="6057900" imgH="762000" progId="Equation.DSMT4">
+                <p:oleObj spid="_x0000_s26683" name="Equation" r:id="rId4" imgW="6057900" imgH="762000" progId="Equation.DSMT4">
                   <p:embed/>
                 </p:oleObj>
               </mc:Choice>
@@ -21021,7 +20974,7 @@
           <a:graphicData uri="http://schemas.openxmlformats.org/presentationml/2006/ole">
             <mc:AlternateContent xmlns:mc="http://schemas.openxmlformats.org/markup-compatibility/2006">
               <mc:Choice xmlns:v="urn:schemas-microsoft-com:vml" Requires="v">
-                <p:oleObj spid="_x0000_s26676" name="Equation" r:id="rId6" imgW="1650960" imgH="520560" progId="Equation.DSMT4">
+                <p:oleObj spid="_x0000_s26684" name="Equation" r:id="rId6" imgW="1650960" imgH="520560" progId="Equation.DSMT4">
                   <p:embed/>
                 </p:oleObj>
               </mc:Choice>
@@ -21116,7 +21069,7 @@
           <a:graphicData uri="http://schemas.openxmlformats.org/presentationml/2006/ole">
             <mc:AlternateContent xmlns:mc="http://schemas.openxmlformats.org/markup-compatibility/2006">
               <mc:Choice xmlns:v="urn:schemas-microsoft-com:vml" Requires="v">
-                <p:oleObj spid="_x0000_s26677" name="Equation" r:id="rId8" imgW="1650960" imgH="520560" progId="Equation.DSMT4">
+                <p:oleObj spid="_x0000_s26685" name="Equation" r:id="rId8" imgW="1650960" imgH="520560" progId="Equation.DSMT4">
                   <p:embed/>
                 </p:oleObj>
               </mc:Choice>
@@ -21217,7 +21170,7 @@
           <a:graphicData uri="http://schemas.openxmlformats.org/presentationml/2006/ole">
             <mc:AlternateContent xmlns:mc="http://schemas.openxmlformats.org/markup-compatibility/2006">
               <mc:Choice xmlns:v="urn:schemas-microsoft-com:vml" Requires="v">
-                <p:oleObj spid="_x0000_s26678" name="Equation" r:id="rId10" imgW="6413500" imgH="762000" progId="Equation.DSMT4">
+                <p:oleObj spid="_x0000_s26686" name="Equation" r:id="rId10" imgW="6413500" imgH="762000" progId="Equation.DSMT4">
                   <p:embed/>
                 </p:oleObj>
               </mc:Choice>
@@ -21287,7 +21240,7 @@
           <a:graphicData uri="http://schemas.openxmlformats.org/presentationml/2006/ole">
             <mc:AlternateContent xmlns:mc="http://schemas.openxmlformats.org/markup-compatibility/2006">
               <mc:Choice xmlns:v="urn:schemas-microsoft-com:vml" Requires="v">
-                <p:oleObj spid="_x0000_s26679" name="Equation" r:id="rId12" imgW="7175500" imgH="1612900" progId="Equation.DSMT4">
+                <p:oleObj spid="_x0000_s26687" name="Equation" r:id="rId12" imgW="7175500" imgH="1612900" progId="Equation.DSMT4">
                   <p:embed/>
                 </p:oleObj>
               </mc:Choice>
@@ -21351,7 +21304,7 @@
           <a:graphicData uri="http://schemas.openxmlformats.org/presentationml/2006/ole">
             <mc:AlternateContent xmlns:mc="http://schemas.openxmlformats.org/markup-compatibility/2006">
               <mc:Choice xmlns:v="urn:schemas-microsoft-com:vml" Requires="v">
-                <p:oleObj spid="_x0000_s26680" name="Equation" r:id="rId14" imgW="3047760" imgH="1193760" progId="Equation.DSMT4">
+                <p:oleObj spid="_x0000_s26688" name="Equation" r:id="rId14" imgW="3047760" imgH="1193760" progId="Equation.DSMT4">
                   <p:embed/>
                 </p:oleObj>
               </mc:Choice>
@@ -21427,7 +21380,7 @@
           <a:graphicData uri="http://schemas.openxmlformats.org/presentationml/2006/ole">
             <mc:AlternateContent xmlns:mc="http://schemas.openxmlformats.org/markup-compatibility/2006">
               <mc:Choice xmlns:v="urn:schemas-microsoft-com:vml" Requires="v">
-                <p:oleObj spid="_x0000_s26681" name="Equation" r:id="rId16" imgW="1422400" imgH="1409700" progId="Equation.DSMT4">
+                <p:oleObj spid="_x0000_s26689" name="Equation" r:id="rId16" imgW="1422400" imgH="1409700" progId="Equation.DSMT4">
                   <p:embed/>
                 </p:oleObj>
               </mc:Choice>
@@ -22049,7 +22002,7 @@
           <a:graphicData uri="http://schemas.openxmlformats.org/presentationml/2006/ole">
             <mc:AlternateContent xmlns:mc="http://schemas.openxmlformats.org/markup-compatibility/2006">
               <mc:Choice xmlns:v="urn:schemas-microsoft-com:vml" Requires="v">
-                <p:oleObj spid="_x0000_s105531" name="Equation" r:id="rId4" imgW="6388100" imgH="850900" progId="Equation.DSMT4">
+                <p:oleObj spid="_x0000_s105539" name="Equation" r:id="rId4" imgW="6388100" imgH="850900" progId="Equation.DSMT4">
                   <p:embed/>
                 </p:oleObj>
               </mc:Choice>
@@ -22113,7 +22066,7 @@
           <a:graphicData uri="http://schemas.openxmlformats.org/presentationml/2006/ole">
             <mc:AlternateContent xmlns:mc="http://schemas.openxmlformats.org/markup-compatibility/2006">
               <mc:Choice xmlns:v="urn:schemas-microsoft-com:vml" Requires="v">
-                <p:oleObj spid="_x0000_s105532" name="Equation" r:id="rId6" imgW="1676160" imgH="558720" progId="Equation.DSMT4">
+                <p:oleObj spid="_x0000_s105540" name="Equation" r:id="rId6" imgW="1676160" imgH="558720" progId="Equation.DSMT4">
                   <p:embed/>
                 </p:oleObj>
               </mc:Choice>
@@ -22183,7 +22136,7 @@
           <a:graphicData uri="http://schemas.openxmlformats.org/presentationml/2006/ole">
             <mc:AlternateContent xmlns:mc="http://schemas.openxmlformats.org/markup-compatibility/2006">
               <mc:Choice xmlns:v="urn:schemas-microsoft-com:vml" Requires="v">
-                <p:oleObj spid="_x0000_s105533" name="Equation" r:id="rId8" imgW="1231560" imgH="571320" progId="Equation.DSMT4">
+                <p:oleObj spid="_x0000_s105541" name="Equation" r:id="rId8" imgW="1231560" imgH="571320" progId="Equation.DSMT4">
                   <p:embed/>
                 </p:oleObj>
               </mc:Choice>
@@ -22259,7 +22212,7 @@
           <a:graphicData uri="http://schemas.openxmlformats.org/presentationml/2006/ole">
             <mc:AlternateContent xmlns:mc="http://schemas.openxmlformats.org/markup-compatibility/2006">
               <mc:Choice xmlns:v="urn:schemas-microsoft-com:vml" Requires="v">
-                <p:oleObj spid="_x0000_s105534" name="Equation" r:id="rId10" imgW="6311900" imgH="850900" progId="Equation.DSMT4">
+                <p:oleObj spid="_x0000_s105542" name="Equation" r:id="rId10" imgW="6311900" imgH="850900" progId="Equation.DSMT4">
                   <p:embed/>
                 </p:oleObj>
               </mc:Choice>
@@ -22532,7 +22485,7 @@
           <a:graphicData uri="http://schemas.openxmlformats.org/presentationml/2006/ole">
             <mc:AlternateContent xmlns:mc="http://schemas.openxmlformats.org/markup-compatibility/2006">
               <mc:Choice xmlns:v="urn:schemas-microsoft-com:vml" Requires="v">
-                <p:oleObj spid="_x0000_s105535" name="Equation" r:id="rId12" imgW="4000500" imgH="850900" progId="Equation.DSMT4">
+                <p:oleObj spid="_x0000_s105543" name="Equation" r:id="rId12" imgW="4000500" imgH="850900" progId="Equation.DSMT4">
                   <p:embed/>
                 </p:oleObj>
               </mc:Choice>
@@ -22602,7 +22555,7 @@
           <a:graphicData uri="http://schemas.openxmlformats.org/presentationml/2006/ole">
             <mc:AlternateContent xmlns:mc="http://schemas.openxmlformats.org/markup-compatibility/2006">
               <mc:Choice xmlns:v="urn:schemas-microsoft-com:vml" Requires="v">
-                <p:oleObj spid="_x0000_s105536" name="Equation" r:id="rId14" imgW="3302000" imgH="571500" progId="Equation.DSMT4">
+                <p:oleObj spid="_x0000_s105544" name="Equation" r:id="rId14" imgW="3302000" imgH="571500" progId="Equation.DSMT4">
                   <p:embed/>
                 </p:oleObj>
               </mc:Choice>
@@ -22666,7 +22619,7 @@
           <a:graphicData uri="http://schemas.openxmlformats.org/presentationml/2006/ole">
             <mc:AlternateContent xmlns:mc="http://schemas.openxmlformats.org/markup-compatibility/2006">
               <mc:Choice xmlns:v="urn:schemas-microsoft-com:vml" Requires="v">
-                <p:oleObj spid="_x0000_s105537" name="Equation" r:id="rId16" imgW="2641320" imgH="1168200" progId="Equation.DSMT4">
+                <p:oleObj spid="_x0000_s105545" name="Equation" r:id="rId16" imgW="2641320" imgH="1168200" progId="Equation.DSMT4">
                   <p:embed/>
                 </p:oleObj>
               </mc:Choice>
@@ -24710,7 +24663,7 @@
           <a:graphicData uri="http://schemas.openxmlformats.org/presentationml/2006/ole">
             <mc:AlternateContent xmlns:mc="http://schemas.openxmlformats.org/markup-compatibility/2006">
               <mc:Choice xmlns:v="urn:schemas-microsoft-com:vml" Requires="v">
-                <p:oleObj spid="_x0000_s55322" name="Equation" r:id="rId5" imgW="3390840" imgH="634680" progId="Equation.DSMT4">
+                <p:oleObj spid="_x0000_s55327" name="Equation" r:id="rId5" imgW="3390840" imgH="634680" progId="Equation.DSMT4">
                   <p:embed/>
                 </p:oleObj>
               </mc:Choice>
@@ -24780,7 +24733,7 @@
           <a:graphicData uri="http://schemas.openxmlformats.org/presentationml/2006/ole">
             <mc:AlternateContent xmlns:mc="http://schemas.openxmlformats.org/markup-compatibility/2006">
               <mc:Choice xmlns:v="urn:schemas-microsoft-com:vml" Requires="v">
-                <p:oleObj spid="_x0000_s55323" name="Equation" r:id="rId7" imgW="1930320" imgH="634680" progId="Equation.DSMT4">
+                <p:oleObj spid="_x0000_s55328" name="Equation" r:id="rId7" imgW="1930320" imgH="634680" progId="Equation.DSMT4">
                   <p:embed/>
                 </p:oleObj>
               </mc:Choice>
@@ -24850,7 +24803,7 @@
           <a:graphicData uri="http://schemas.openxmlformats.org/presentationml/2006/ole">
             <mc:AlternateContent xmlns:mc="http://schemas.openxmlformats.org/markup-compatibility/2006">
               <mc:Choice xmlns:v="urn:schemas-microsoft-com:vml" Requires="v">
-                <p:oleObj spid="_x0000_s55324" name="Equation" r:id="rId9" imgW="3530520" imgH="647640" progId="Equation.DSMT4">
+                <p:oleObj spid="_x0000_s55329" name="Equation" r:id="rId9" imgW="3530520" imgH="647640" progId="Equation.DSMT4">
                   <p:embed/>
                 </p:oleObj>
               </mc:Choice>
@@ -24934,7 +24887,7 @@
             <a:graphicData uri="http://schemas.openxmlformats.org/presentationml/2006/ole">
               <mc:AlternateContent xmlns:mc="http://schemas.openxmlformats.org/markup-compatibility/2006">
                 <mc:Choice xmlns:v="urn:schemas-microsoft-com:vml" Requires="v">
-                  <p:oleObj spid="_x0000_s55325" name="Equation" r:id="rId11" imgW="3352680" imgH="634680" progId="Equation.DSMT4">
+                  <p:oleObj spid="_x0000_s55330" name="Equation" r:id="rId11" imgW="3352680" imgH="634680" progId="Equation.DSMT4">
                     <p:embed/>
                   </p:oleObj>
                 </mc:Choice>

</xml_diff>